<commit_message>
Grid Search with Keras
</commit_message>
<xml_diff>
--- a/Week 3/03 - Model Fitting.pptx
+++ b/Week 3/03 - Model Fitting.pptx
@@ -211,7 +211,7 @@
           <a:p>
             <a:fld id="{EFA659FB-0419-C24D-A6C0-9A1B475B1E65}" type="datetimeFigureOut">
               <a:rPr lang="en-US" smtClean="0"/>
-              <a:t>1/29/22</a:t>
+              <a:t>1/30/22</a:t>
             </a:fld>
             <a:endParaRPr lang="en-US"/>
           </a:p>
@@ -1180,7 +1180,7 @@
           <a:p>
             <a:fld id="{87C2F797-6DFD-C74C-BA29-8B3CE1E6C725}" type="datetime1">
               <a:rPr lang="en-US" smtClean="0"/>
-              <a:t>1/29/22</a:t>
+              <a:t>1/30/22</a:t>
             </a:fld>
             <a:endParaRPr lang="en-US"/>
           </a:p>
@@ -1388,7 +1388,7 @@
           <a:p>
             <a:fld id="{64FE1960-B74B-0949-9DEF-CBE661CB7825}" type="datetime1">
               <a:rPr lang="en-US" smtClean="0"/>
-              <a:t>1/29/22</a:t>
+              <a:t>1/30/22</a:t>
             </a:fld>
             <a:endParaRPr lang="en-US"/>
           </a:p>
@@ -1586,7 +1586,7 @@
           <a:p>
             <a:fld id="{91871F70-41C7-F44D-9284-EB301E270CC7}" type="datetime1">
               <a:rPr lang="en-US" smtClean="0"/>
-              <a:t>1/29/22</a:t>
+              <a:t>1/30/22</a:t>
             </a:fld>
             <a:endParaRPr lang="en-US"/>
           </a:p>
@@ -1899,7 +1899,7 @@
           <a:p>
             <a:fld id="{E33F645A-02C2-AF41-9FDB-389E34E8B990}" type="datetime1">
               <a:rPr lang="en-US" smtClean="0"/>
-              <a:t>1/29/22</a:t>
+              <a:t>1/30/22</a:t>
             </a:fld>
             <a:endParaRPr lang="en-US"/>
           </a:p>
@@ -2164,7 +2164,7 @@
           <a:p>
             <a:fld id="{AB873A4C-DE8A-2F49-8ABE-1735EE515528}" type="datetime1">
               <a:rPr lang="en-US" smtClean="0"/>
-              <a:t>1/29/22</a:t>
+              <a:t>1/30/22</a:t>
             </a:fld>
             <a:endParaRPr lang="en-US"/>
           </a:p>
@@ -2576,7 +2576,7 @@
           <a:p>
             <a:fld id="{7DA13BA6-E929-9643-AF0C-C0B90BC6EAC0}" type="datetime1">
               <a:rPr lang="en-US" smtClean="0"/>
-              <a:t>1/29/22</a:t>
+              <a:t>1/30/22</a:t>
             </a:fld>
             <a:endParaRPr lang="en-US"/>
           </a:p>
@@ -2717,7 +2717,7 @@
           <a:p>
             <a:fld id="{1062371E-C5A0-7448-8CF8-A797D242C61D}" type="datetime1">
               <a:rPr lang="en-US" smtClean="0"/>
-              <a:t>1/29/22</a:t>
+              <a:t>1/30/22</a:t>
             </a:fld>
             <a:endParaRPr lang="en-US"/>
           </a:p>
@@ -2830,7 +2830,7 @@
           <a:p>
             <a:fld id="{33C9D714-59A4-C649-915B-E960BF4AC878}" type="datetime1">
               <a:rPr lang="en-US" smtClean="0"/>
-              <a:t>1/29/22</a:t>
+              <a:t>1/30/22</a:t>
             </a:fld>
             <a:endParaRPr lang="en-US"/>
           </a:p>
@@ -3141,7 +3141,7 @@
           <a:p>
             <a:fld id="{3951679C-160D-1F41-A3C3-54837256FB50}" type="datetime1">
               <a:rPr lang="en-US" smtClean="0"/>
-              <a:t>1/29/22</a:t>
+              <a:t>1/30/22</a:t>
             </a:fld>
             <a:endParaRPr lang="en-US"/>
           </a:p>
@@ -3429,7 +3429,7 @@
           <a:p>
             <a:fld id="{296B5A14-0E14-114B-AA5F-546D4BF7B2DC}" type="datetime1">
               <a:rPr lang="en-US" smtClean="0"/>
-              <a:t>1/29/22</a:t>
+              <a:t>1/30/22</a:t>
             </a:fld>
             <a:endParaRPr lang="en-US"/>
           </a:p>
@@ -3670,7 +3670,7 @@
           <a:p>
             <a:fld id="{1A75E9CF-B19A-3C42-99C1-DBC4AFBA0816}" type="datetime1">
               <a:rPr lang="en-US" smtClean="0"/>
-              <a:t>1/29/22</a:t>
+              <a:t>1/30/22</a:t>
             </a:fld>
             <a:endParaRPr lang="en-US"/>
           </a:p>
@@ -4863,7 +4863,7 @@
               <a:rPr lang="en-US" b="1" dirty="0">
                 <a:latin typeface="Quicksand" pitchFamily="2" charset="77"/>
               </a:rPr>
-              <a:t>Facilitate Hyperparameter Tuning and Cross-validation</a:t>
+              <a:t>Facilitate Hyperparameter Tuning and Cross-validation of a Deep Net</a:t>
             </a:r>
           </a:p>
           <a:p>

</xml_diff>